<commit_message>
update, canonical exhaustion markers
</commit_message>
<xml_diff>
--- a/experiments/GSE120575/GSE120575_results.pptx
+++ b/experiments/GSE120575/GSE120575_results.pptx
@@ -5,11 +5,12 @@
     <p:sldMasterId id="2147483648" r:id="rId1"/>
   </p:sldMasterIdLst>
   <p:sldIdLst>
-    <p:sldId id="256" r:id="rId7"/>
-    <p:sldId id="257" r:id="rId8"/>
-    <p:sldId id="258" r:id="rId9"/>
-    <p:sldId id="259" r:id="rId10"/>
-    <p:sldId id="260" r:id="rId11"/>
+    <p:sldId r:id="rId7" id="256"/>
+    <p:sldId r:id="rId8" id="257"/>
+    <p:sldId r:id="rId9" id="258"/>
+    <p:sldId r:id="rId10" id="259"/>
+    <p:sldId r:id="rId11" id="260"/>
+    <p:sldId r:id="rId12" id="261"/>
   </p:sldIdLst>
   <p:sldSz cx="14630400" cy="8229600" type="screen4x3"/>
   <p:notesSz cx="6858000" cy="9144000"/>
@@ -3953,6 +3954,129 @@
           </a:prstGeom>
         </p:spPr>
       </p:pic>
+    </p:spTree>
+  </p:cSld>
+  <p:clrMapOvr>
+    <a:masterClrMapping/>
+  </p:clrMapOvr>
+</p:sld>
+</file>
+
+<file path=ppt/slides/slide6.xml><?xml version="1.0" encoding="utf-8"?>
+<p:sld xmlns:a="http://schemas.openxmlformats.org/drawingml/2006/main" xmlns:p="http://schemas.openxmlformats.org/presentationml/2006/main" xmlns:r="http://schemas.openxmlformats.org/officeDocument/2006/relationships">
+  <p:cSld>
+    <p:spTree>
+      <p:nvGrpSpPr>
+        <p:cNvPr id="1" name=""/>
+        <p:cNvGrpSpPr/>
+        <p:nvPr/>
+      </p:nvGrpSpPr>
+      <p:grpSpPr/>
+      <p:sp>
+        <p:nvSpPr>
+          <p:cNvPr id="2" name="TextBox 1"/>
+          <p:cNvSpPr txBox="1"/>
+          <p:nvPr/>
+        </p:nvSpPr>
+        <p:spPr>
+          <a:xfrm>
+            <a:off x="0" y="0"/>
+            <a:ext cx="914400" cy="914400"/>
+          </a:xfrm>
+          <a:prstGeom prst="rect">
+            <a:avLst/>
+          </a:prstGeom>
+          <a:noFill/>
+        </p:spPr>
+        <p:txBody>
+          <a:bodyPr wrap="none">
+            <a:spAutoFit/>
+          </a:bodyPr>
+          <a:lstStyle/>
+          <a:p>
+            <a:r>
+              <a:t>GSE120575: TILs from cancer patients receiving immune checkpoint blockade</a:t>
+            </a:r>
+          </a:p>
+          <a:p>
+            <a:r>
+              <a:t>Violin plots for canonical exhaustion markers (baseline)</a:t>
+            </a:r>
+          </a:p>
+        </p:txBody>
+      </p:sp>
+      <p:pic>
+        <p:nvPicPr>
+          <p:cNvPr id="3" name="Picture 2" descr="GSE120575_prepare_vlnplot_response_exhaustion_markers_baseline.jpeg"/>
+          <p:cNvPicPr>
+            <a:picLocks noChangeAspect="1"/>
+          </p:cNvPicPr>
+          <p:nvPr/>
+        </p:nvPicPr>
+        <p:blipFill>
+          <a:blip r:embed="rId2"/>
+          <a:stretch>
+            <a:fillRect/>
+          </a:stretch>
+        </p:blipFill>
+        <p:spPr>
+          <a:xfrm>
+            <a:off x="457200" y="914400"/>
+            <a:ext cx="9753600" cy="7315200"/>
+          </a:xfrm>
+          <a:prstGeom prst="rect">
+            <a:avLst/>
+          </a:prstGeom>
+        </p:spPr>
+      </p:pic>
+      <p:sp>
+        <p:nvSpPr>
+          <p:cNvPr id="4" name="TextBox 3"/>
+          <p:cNvSpPr txBox="1"/>
+          <p:nvPr/>
+        </p:nvSpPr>
+        <p:spPr>
+          <a:xfrm>
+            <a:off x="10058400" y="5029200"/>
+            <a:ext cx="914400" cy="914400"/>
+          </a:xfrm>
+          <a:prstGeom prst="rect">
+            <a:avLst/>
+          </a:prstGeom>
+          <a:noFill/>
+        </p:spPr>
+        <p:txBody>
+          <a:bodyPr wrap="none">
+            <a:spAutoFit/>
+          </a:bodyPr>
+          <a:lstStyle/>
+          <a:p>
+            <a:r>
+              <a:t>Gene and corresponding protein</a:t>
+            </a:r>
+          </a:p>
+          <a:p>
+            <a:r>
+              <a:t>PDCD1 encodes PD-1</a:t>
+            </a:r>
+          </a:p>
+          <a:p>
+            <a:r>
+              <a:t>HAVCR2 encodes TIM-3</a:t>
+            </a:r>
+          </a:p>
+          <a:p>
+            <a:r>
+              <a:t>LAG3 encodes LAG-3</a:t>
+            </a:r>
+          </a:p>
+          <a:p>
+            <a:r>
+              <a:t>CTLA4 encodes CTLA-4</a:t>
+            </a:r>
+          </a:p>
+        </p:txBody>
+      </p:sp>
     </p:spTree>
   </p:cSld>
   <p:clrMapOvr>

</xml_diff>